<commit_message>
iskomentarisao link prema obavestenjima
</commit_message>
<xml_diff>
--- a/predavanja/prezentacije/UVIT01-02-Uvod u Internet.pptx
+++ b/predavanja/prezentacije/UVIT01-02-Uvod u Internet.pptx
@@ -338,7 +338,7 @@
           <a:p>
             <a:fld id="{F07B70C6-757F-4600-A347-5E68BBCA3609}" type="datetimeFigureOut">
               <a:rPr lang="en-US" smtClean="0"/>
-              <a:t>10/6/2018</a:t>
+              <a:t>10/7/2018</a:t>
             </a:fld>
             <a:endParaRPr lang="en-US"/>
           </a:p>
@@ -503,7 +503,7 @@
           <a:p>
             <a:fld id="{6B3683FA-0560-4266-A2CA-8A7D404C35FD}" type="datetimeFigureOut">
               <a:rPr lang="en-US" smtClean="0"/>
-              <a:t>10/6/2018</a:t>
+              <a:t>10/7/2018</a:t>
             </a:fld>
             <a:endParaRPr lang="en-US"/>
           </a:p>
@@ -1245,7 +1245,7 @@
           <a:p>
             <a:fld id="{4F17076B-8A0A-4D88-8A59-70E1D7445D20}" type="slidenum">
               <a:rPr lang="en-US" smtClean="0"/>
-              <a:t>34</a:t>
+              <a:t>33</a:t>
             </a:fld>
             <a:endParaRPr lang="en-US"/>
           </a:p>
@@ -1329,7 +1329,7 @@
           <a:p>
             <a:fld id="{4F17076B-8A0A-4D88-8A59-70E1D7445D20}" type="slidenum">
               <a:rPr lang="en-US" smtClean="0"/>
-              <a:t>35</a:t>
+              <a:t>34</a:t>
             </a:fld>
             <a:endParaRPr lang="en-US"/>
           </a:p>
@@ -1413,7 +1413,7 @@
           <a:p>
             <a:fld id="{4F17076B-8A0A-4D88-8A59-70E1D7445D20}" type="slidenum">
               <a:rPr lang="en-US" smtClean="0"/>
-              <a:t>36</a:t>
+              <a:t>35</a:t>
             </a:fld>
             <a:endParaRPr lang="en-US"/>
           </a:p>
@@ -1497,7 +1497,7 @@
           <a:p>
             <a:fld id="{4F17076B-8A0A-4D88-8A59-70E1D7445D20}" type="slidenum">
               <a:rPr lang="en-US" smtClean="0"/>
-              <a:t>38</a:t>
+              <a:t>36</a:t>
             </a:fld>
             <a:endParaRPr lang="en-US"/>
           </a:p>
@@ -1581,7 +1581,7 @@
           <a:p>
             <a:fld id="{4F17076B-8A0A-4D88-8A59-70E1D7445D20}" type="slidenum">
               <a:rPr lang="en-US" smtClean="0"/>
-              <a:t>39</a:t>
+              <a:t>38</a:t>
             </a:fld>
             <a:endParaRPr lang="en-US"/>
           </a:p>
@@ -1665,7 +1665,7 @@
           <a:p>
             <a:fld id="{4F17076B-8A0A-4D88-8A59-70E1D7445D20}" type="slidenum">
               <a:rPr lang="en-US" smtClean="0"/>
-              <a:t>40</a:t>
+              <a:t>39</a:t>
             </a:fld>
             <a:endParaRPr lang="en-US"/>
           </a:p>
@@ -1749,7 +1749,7 @@
           <a:p>
             <a:fld id="{4F17076B-8A0A-4D88-8A59-70E1D7445D20}" type="slidenum">
               <a:rPr lang="en-US" smtClean="0"/>
-              <a:t>41</a:t>
+              <a:t>40</a:t>
             </a:fld>
             <a:endParaRPr lang="en-US"/>
           </a:p>
@@ -1833,7 +1833,7 @@
           <a:p>
             <a:fld id="{4F17076B-8A0A-4D88-8A59-70E1D7445D20}" type="slidenum">
               <a:rPr lang="en-US" smtClean="0"/>
-              <a:t>42</a:t>
+              <a:t>41</a:t>
             </a:fld>
             <a:endParaRPr lang="en-US"/>
           </a:p>
@@ -1917,7 +1917,7 @@
           <a:p>
             <a:fld id="{4F17076B-8A0A-4D88-8A59-70E1D7445D20}" type="slidenum">
               <a:rPr lang="en-US" smtClean="0"/>
-              <a:t>43</a:t>
+              <a:t>42</a:t>
             </a:fld>
             <a:endParaRPr lang="en-US"/>
           </a:p>
@@ -2001,7 +2001,7 @@
           <a:p>
             <a:fld id="{4F17076B-8A0A-4D88-8A59-70E1D7445D20}" type="slidenum">
               <a:rPr lang="en-US" smtClean="0"/>
-              <a:t>44</a:t>
+              <a:t>43</a:t>
             </a:fld>
             <a:endParaRPr lang="en-US"/>
           </a:p>
@@ -2064,7 +2064,7 @@
           <a:bodyPr/>
           <a:lstStyle/>
           <a:p>
-            <a:endParaRPr lang="en-US" dirty="0"/>
+            <a:endParaRPr lang="sr-Latn-RS" dirty="0"/>
           </a:p>
         </p:txBody>
       </p:sp>
@@ -2085,7 +2085,7 @@
           <a:p>
             <a:fld id="{4F17076B-8A0A-4D88-8A59-70E1D7445D20}" type="slidenum">
               <a:rPr lang="en-US" smtClean="0"/>
-              <a:t>26</a:t>
+              <a:t>20</a:t>
             </a:fld>
             <a:endParaRPr lang="en-US"/>
           </a:p>
@@ -2094,7 +2094,7 @@
     </p:spTree>
     <p:extLst>
       <p:ext uri="{BB962C8B-B14F-4D97-AF65-F5344CB8AC3E}">
-        <p14:creationId xmlns:p14="http://schemas.microsoft.com/office/powerpoint/2010/main" val="109522752"/>
+        <p14:creationId xmlns:p14="http://schemas.microsoft.com/office/powerpoint/2010/main" val="902178310"/>
       </p:ext>
     </p:extLst>
   </p:cSld>
@@ -2169,7 +2169,7 @@
           <a:p>
             <a:fld id="{4F17076B-8A0A-4D88-8A59-70E1D7445D20}" type="slidenum">
               <a:rPr lang="en-US" smtClean="0"/>
-              <a:t>45</a:t>
+              <a:t>44</a:t>
             </a:fld>
             <a:endParaRPr lang="en-US"/>
           </a:p>
@@ -2253,7 +2253,7 @@
           <a:p>
             <a:fld id="{4F17076B-8A0A-4D88-8A59-70E1D7445D20}" type="slidenum">
               <a:rPr lang="en-US" smtClean="0"/>
-              <a:t>46</a:t>
+              <a:t>45</a:t>
             </a:fld>
             <a:endParaRPr lang="en-US"/>
           </a:p>
@@ -2337,7 +2337,7 @@
           <a:p>
             <a:fld id="{4F17076B-8A0A-4D88-8A59-70E1D7445D20}" type="slidenum">
               <a:rPr lang="en-US" smtClean="0"/>
-              <a:t>47</a:t>
+              <a:t>46</a:t>
             </a:fld>
             <a:endParaRPr lang="en-US"/>
           </a:p>
@@ -2421,7 +2421,7 @@
           <a:p>
             <a:fld id="{4F17076B-8A0A-4D88-8A59-70E1D7445D20}" type="slidenum">
               <a:rPr lang="en-US" smtClean="0"/>
-              <a:t>48</a:t>
+              <a:t>47</a:t>
             </a:fld>
             <a:endParaRPr lang="en-US"/>
           </a:p>
@@ -2505,7 +2505,7 @@
           <a:p>
             <a:fld id="{4F17076B-8A0A-4D88-8A59-70E1D7445D20}" type="slidenum">
               <a:rPr lang="en-US" smtClean="0"/>
-              <a:t>49</a:t>
+              <a:t>48</a:t>
             </a:fld>
             <a:endParaRPr lang="en-US"/>
           </a:p>
@@ -2589,7 +2589,7 @@
           <a:p>
             <a:fld id="{4F17076B-8A0A-4D88-8A59-70E1D7445D20}" type="slidenum">
               <a:rPr lang="en-US" smtClean="0"/>
-              <a:t>50</a:t>
+              <a:t>49</a:t>
             </a:fld>
             <a:endParaRPr lang="en-US"/>
           </a:p>
@@ -2673,7 +2673,7 @@
           <a:p>
             <a:fld id="{4F17076B-8A0A-4D88-8A59-70E1D7445D20}" type="slidenum">
               <a:rPr lang="en-US" smtClean="0"/>
-              <a:t>51</a:t>
+              <a:t>50</a:t>
             </a:fld>
             <a:endParaRPr lang="en-US"/>
           </a:p>
@@ -2757,7 +2757,7 @@
           <a:p>
             <a:fld id="{4F17076B-8A0A-4D88-8A59-70E1D7445D20}" type="slidenum">
               <a:rPr lang="en-US" smtClean="0"/>
-              <a:t>52</a:t>
+              <a:t>51</a:t>
             </a:fld>
             <a:endParaRPr lang="en-US"/>
           </a:p>
@@ -2841,7 +2841,7 @@
           <a:p>
             <a:fld id="{4F17076B-8A0A-4D88-8A59-70E1D7445D20}" type="slidenum">
               <a:rPr lang="en-US" smtClean="0"/>
-              <a:t>53</a:t>
+              <a:t>52</a:t>
             </a:fld>
             <a:endParaRPr lang="en-US"/>
           </a:p>
@@ -2925,7 +2925,7 @@
           <a:p>
             <a:fld id="{4F17076B-8A0A-4D88-8A59-70E1D7445D20}" type="slidenum">
               <a:rPr lang="en-US" smtClean="0"/>
-              <a:t>54</a:t>
+              <a:t>53</a:t>
             </a:fld>
             <a:endParaRPr lang="en-US"/>
           </a:p>
@@ -3009,7 +3009,7 @@
           <a:p>
             <a:fld id="{4F17076B-8A0A-4D88-8A59-70E1D7445D20}" type="slidenum">
               <a:rPr lang="en-US" smtClean="0"/>
-              <a:t>27</a:t>
+              <a:t>26</a:t>
             </a:fld>
             <a:endParaRPr lang="en-US"/>
           </a:p>
@@ -3093,7 +3093,7 @@
           <a:p>
             <a:fld id="{4F17076B-8A0A-4D88-8A59-70E1D7445D20}" type="slidenum">
               <a:rPr lang="en-US" smtClean="0"/>
-              <a:t>55</a:t>
+              <a:t>54</a:t>
             </a:fld>
             <a:endParaRPr lang="en-US"/>
           </a:p>
@@ -3177,7 +3177,7 @@
           <a:p>
             <a:fld id="{4F17076B-8A0A-4D88-8A59-70E1D7445D20}" type="slidenum">
               <a:rPr lang="en-US" smtClean="0"/>
-              <a:t>56</a:t>
+              <a:t>55</a:t>
             </a:fld>
             <a:endParaRPr lang="en-US"/>
           </a:p>
@@ -3261,7 +3261,7 @@
           <a:p>
             <a:fld id="{4F17076B-8A0A-4D88-8A59-70E1D7445D20}" type="slidenum">
               <a:rPr lang="en-US" smtClean="0"/>
-              <a:t>57</a:t>
+              <a:t>56</a:t>
             </a:fld>
             <a:endParaRPr lang="en-US"/>
           </a:p>
@@ -3345,7 +3345,7 @@
           <a:p>
             <a:fld id="{4F17076B-8A0A-4D88-8A59-70E1D7445D20}" type="slidenum">
               <a:rPr lang="en-US" smtClean="0"/>
-              <a:t>58</a:t>
+              <a:t>57</a:t>
             </a:fld>
             <a:endParaRPr lang="en-US"/>
           </a:p>
@@ -3429,7 +3429,7 @@
           <a:p>
             <a:fld id="{4F17076B-8A0A-4D88-8A59-70E1D7445D20}" type="slidenum">
               <a:rPr lang="en-US" smtClean="0"/>
-              <a:t>59</a:t>
+              <a:t>58</a:t>
             </a:fld>
             <a:endParaRPr lang="en-US"/>
           </a:p>
@@ -3513,7 +3513,7 @@
           <a:p>
             <a:fld id="{4F17076B-8A0A-4D88-8A59-70E1D7445D20}" type="slidenum">
               <a:rPr lang="en-US" smtClean="0"/>
-              <a:t>60</a:t>
+              <a:t>59</a:t>
             </a:fld>
             <a:endParaRPr lang="en-US"/>
           </a:p>
@@ -3597,7 +3597,7 @@
           <a:p>
             <a:fld id="{4F17076B-8A0A-4D88-8A59-70E1D7445D20}" type="slidenum">
               <a:rPr lang="en-US" smtClean="0"/>
-              <a:t>61</a:t>
+              <a:t>60</a:t>
             </a:fld>
             <a:endParaRPr lang="en-US"/>
           </a:p>
@@ -3681,7 +3681,7 @@
           <a:p>
             <a:fld id="{4F17076B-8A0A-4D88-8A59-70E1D7445D20}" type="slidenum">
               <a:rPr lang="en-US" smtClean="0"/>
-              <a:t>62</a:t>
+              <a:t>61</a:t>
             </a:fld>
             <a:endParaRPr lang="en-US"/>
           </a:p>
@@ -3765,7 +3765,7 @@
           <a:p>
             <a:fld id="{4F17076B-8A0A-4D88-8A59-70E1D7445D20}" type="slidenum">
               <a:rPr lang="en-US" smtClean="0"/>
-              <a:t>63</a:t>
+              <a:t>62</a:t>
             </a:fld>
             <a:endParaRPr lang="en-US"/>
           </a:p>
@@ -3849,7 +3849,7 @@
           <a:p>
             <a:fld id="{4F17076B-8A0A-4D88-8A59-70E1D7445D20}" type="slidenum">
               <a:rPr lang="en-US" smtClean="0"/>
-              <a:t>64</a:t>
+              <a:t>63</a:t>
             </a:fld>
             <a:endParaRPr lang="en-US"/>
           </a:p>
@@ -3933,7 +3933,7 @@
           <a:p>
             <a:fld id="{4F17076B-8A0A-4D88-8A59-70E1D7445D20}" type="slidenum">
               <a:rPr lang="en-US" smtClean="0"/>
-              <a:t>28</a:t>
+              <a:t>27</a:t>
             </a:fld>
             <a:endParaRPr lang="en-US"/>
           </a:p>
@@ -4017,7 +4017,7 @@
           <a:p>
             <a:fld id="{4F17076B-8A0A-4D88-8A59-70E1D7445D20}" type="slidenum">
               <a:rPr lang="en-US" smtClean="0"/>
-              <a:t>66</a:t>
+              <a:t>64</a:t>
             </a:fld>
             <a:endParaRPr lang="en-US"/>
           </a:p>
@@ -4101,7 +4101,7 @@
           <a:p>
             <a:fld id="{4F17076B-8A0A-4D88-8A59-70E1D7445D20}" type="slidenum">
               <a:rPr lang="en-US" smtClean="0"/>
-              <a:t>67</a:t>
+              <a:t>66</a:t>
             </a:fld>
             <a:endParaRPr lang="en-US"/>
           </a:p>
@@ -4185,7 +4185,7 @@
           <a:p>
             <a:fld id="{4F17076B-8A0A-4D88-8A59-70E1D7445D20}" type="slidenum">
               <a:rPr lang="en-US" smtClean="0"/>
-              <a:t>68</a:t>
+              <a:t>67</a:t>
             </a:fld>
             <a:endParaRPr lang="en-US"/>
           </a:p>
@@ -4269,7 +4269,7 @@
           <a:p>
             <a:fld id="{4F17076B-8A0A-4D88-8A59-70E1D7445D20}" type="slidenum">
               <a:rPr lang="en-US" smtClean="0"/>
-              <a:t>69</a:t>
+              <a:t>68</a:t>
             </a:fld>
             <a:endParaRPr lang="en-US"/>
           </a:p>
@@ -4353,7 +4353,7 @@
           <a:p>
             <a:fld id="{4F17076B-8A0A-4D88-8A59-70E1D7445D20}" type="slidenum">
               <a:rPr lang="en-US" smtClean="0"/>
-              <a:t>70</a:t>
+              <a:t>69</a:t>
             </a:fld>
             <a:endParaRPr lang="en-US"/>
           </a:p>
@@ -4437,7 +4437,7 @@
           <a:p>
             <a:fld id="{4F17076B-8A0A-4D88-8A59-70E1D7445D20}" type="slidenum">
               <a:rPr lang="en-US" smtClean="0"/>
-              <a:t>71</a:t>
+              <a:t>70</a:t>
             </a:fld>
             <a:endParaRPr lang="en-US"/>
           </a:p>
@@ -4521,7 +4521,7 @@
           <a:p>
             <a:fld id="{4F17076B-8A0A-4D88-8A59-70E1D7445D20}" type="slidenum">
               <a:rPr lang="en-US" smtClean="0"/>
-              <a:t>72</a:t>
+              <a:t>71</a:t>
             </a:fld>
             <a:endParaRPr lang="en-US"/>
           </a:p>
@@ -4605,7 +4605,7 @@
           <a:p>
             <a:fld id="{4F17076B-8A0A-4D88-8A59-70E1D7445D20}" type="slidenum">
               <a:rPr lang="en-US" smtClean="0"/>
-              <a:t>73</a:t>
+              <a:t>72</a:t>
             </a:fld>
             <a:endParaRPr lang="en-US"/>
           </a:p>
@@ -4689,7 +4689,7 @@
           <a:p>
             <a:fld id="{4F17076B-8A0A-4D88-8A59-70E1D7445D20}" type="slidenum">
               <a:rPr lang="en-US" smtClean="0"/>
-              <a:t>74</a:t>
+              <a:t>73</a:t>
             </a:fld>
             <a:endParaRPr lang="en-US"/>
           </a:p>
@@ -4773,7 +4773,7 @@
           <a:p>
             <a:fld id="{4F17076B-8A0A-4D88-8A59-70E1D7445D20}" type="slidenum">
               <a:rPr lang="en-US" smtClean="0"/>
-              <a:t>75</a:t>
+              <a:t>74</a:t>
             </a:fld>
             <a:endParaRPr lang="en-US"/>
           </a:p>
@@ -4857,7 +4857,7 @@
           <a:p>
             <a:fld id="{4F17076B-8A0A-4D88-8A59-70E1D7445D20}" type="slidenum">
               <a:rPr lang="en-US" smtClean="0"/>
-              <a:t>29</a:t>
+              <a:t>28</a:t>
             </a:fld>
             <a:endParaRPr lang="en-US"/>
           </a:p>
@@ -4941,7 +4941,7 @@
           <a:p>
             <a:fld id="{4F17076B-8A0A-4D88-8A59-70E1D7445D20}" type="slidenum">
               <a:rPr lang="en-US" smtClean="0"/>
-              <a:t>76</a:t>
+              <a:t>75</a:t>
             </a:fld>
             <a:endParaRPr lang="en-US"/>
           </a:p>
@@ -5025,7 +5025,7 @@
           <a:p>
             <a:fld id="{4F17076B-8A0A-4D88-8A59-70E1D7445D20}" type="slidenum">
               <a:rPr lang="en-US" smtClean="0"/>
-              <a:t>77</a:t>
+              <a:t>76</a:t>
             </a:fld>
             <a:endParaRPr lang="en-US"/>
           </a:p>
@@ -5109,7 +5109,7 @@
           <a:p>
             <a:fld id="{4F17076B-8A0A-4D88-8A59-70E1D7445D20}" type="slidenum">
               <a:rPr lang="en-US" smtClean="0"/>
-              <a:t>78</a:t>
+              <a:t>77</a:t>
             </a:fld>
             <a:endParaRPr lang="en-US"/>
           </a:p>
@@ -5193,7 +5193,7 @@
           <a:p>
             <a:fld id="{4F17076B-8A0A-4D88-8A59-70E1D7445D20}" type="slidenum">
               <a:rPr lang="en-US" smtClean="0"/>
-              <a:t>79</a:t>
+              <a:t>78</a:t>
             </a:fld>
             <a:endParaRPr lang="en-US"/>
           </a:p>
@@ -5277,7 +5277,7 @@
           <a:p>
             <a:fld id="{4F17076B-8A0A-4D88-8A59-70E1D7445D20}" type="slidenum">
               <a:rPr lang="en-US" smtClean="0"/>
-              <a:t>80</a:t>
+              <a:t>79</a:t>
             </a:fld>
             <a:endParaRPr lang="en-US"/>
           </a:p>
@@ -5361,7 +5361,7 @@
           <a:p>
             <a:fld id="{4F17076B-8A0A-4D88-8A59-70E1D7445D20}" type="slidenum">
               <a:rPr lang="en-US" smtClean="0"/>
-              <a:t>81</a:t>
+              <a:t>80</a:t>
             </a:fld>
             <a:endParaRPr lang="en-US"/>
           </a:p>
@@ -5445,7 +5445,7 @@
           <a:p>
             <a:fld id="{4F17076B-8A0A-4D88-8A59-70E1D7445D20}" type="slidenum">
               <a:rPr lang="en-US" smtClean="0"/>
-              <a:t>82</a:t>
+              <a:t>81</a:t>
             </a:fld>
             <a:endParaRPr lang="en-US"/>
           </a:p>
@@ -5529,7 +5529,7 @@
           <a:p>
             <a:fld id="{4F17076B-8A0A-4D88-8A59-70E1D7445D20}" type="slidenum">
               <a:rPr lang="en-US" smtClean="0"/>
-              <a:t>83</a:t>
+              <a:t>82</a:t>
             </a:fld>
             <a:endParaRPr lang="en-US"/>
           </a:p>
@@ -5613,7 +5613,7 @@
           <a:p>
             <a:fld id="{4F17076B-8A0A-4D88-8A59-70E1D7445D20}" type="slidenum">
               <a:rPr lang="en-US" smtClean="0"/>
-              <a:t>84</a:t>
+              <a:t>83</a:t>
             </a:fld>
             <a:endParaRPr lang="en-US"/>
           </a:p>
@@ -5697,7 +5697,7 @@
           <a:p>
             <a:fld id="{4F17076B-8A0A-4D88-8A59-70E1D7445D20}" type="slidenum">
               <a:rPr lang="en-US" smtClean="0"/>
-              <a:t>85</a:t>
+              <a:t>84</a:t>
             </a:fld>
             <a:endParaRPr lang="en-US"/>
           </a:p>
@@ -5781,7 +5781,7 @@
           <a:p>
             <a:fld id="{4F17076B-8A0A-4D88-8A59-70E1D7445D20}" type="slidenum">
               <a:rPr lang="en-US" smtClean="0"/>
-              <a:t>30</a:t>
+              <a:t>29</a:t>
             </a:fld>
             <a:endParaRPr lang="en-US"/>
           </a:p>
@@ -5865,7 +5865,7 @@
           <a:p>
             <a:fld id="{4F17076B-8A0A-4D88-8A59-70E1D7445D20}" type="slidenum">
               <a:rPr lang="en-US" smtClean="0"/>
-              <a:t>86</a:t>
+              <a:t>85</a:t>
             </a:fld>
             <a:endParaRPr lang="en-US"/>
           </a:p>
@@ -5949,7 +5949,7 @@
           <a:p>
             <a:fld id="{4F17076B-8A0A-4D88-8A59-70E1D7445D20}" type="slidenum">
               <a:rPr lang="en-US" smtClean="0"/>
-              <a:t>87</a:t>
+              <a:t>86</a:t>
             </a:fld>
             <a:endParaRPr lang="en-US"/>
           </a:p>
@@ -6033,7 +6033,7 @@
           <a:p>
             <a:fld id="{4F17076B-8A0A-4D88-8A59-70E1D7445D20}" type="slidenum">
               <a:rPr lang="en-US" smtClean="0"/>
-              <a:t>88</a:t>
+              <a:t>87</a:t>
             </a:fld>
             <a:endParaRPr lang="en-US"/>
           </a:p>
@@ -6117,7 +6117,7 @@
           <a:p>
             <a:fld id="{4F17076B-8A0A-4D88-8A59-70E1D7445D20}" type="slidenum">
               <a:rPr lang="en-US" smtClean="0"/>
-              <a:t>89</a:t>
+              <a:t>88</a:t>
             </a:fld>
             <a:endParaRPr lang="en-US"/>
           </a:p>
@@ -6201,7 +6201,7 @@
           <a:p>
             <a:fld id="{4F17076B-8A0A-4D88-8A59-70E1D7445D20}" type="slidenum">
               <a:rPr lang="en-US" smtClean="0"/>
-              <a:t>90</a:t>
+              <a:t>89</a:t>
             </a:fld>
             <a:endParaRPr lang="en-US"/>
           </a:p>
@@ -6285,7 +6285,7 @@
           <a:p>
             <a:fld id="{4F17076B-8A0A-4D88-8A59-70E1D7445D20}" type="slidenum">
               <a:rPr lang="en-US" smtClean="0"/>
-              <a:t>91</a:t>
+              <a:t>90</a:t>
             </a:fld>
             <a:endParaRPr lang="en-US"/>
           </a:p>
@@ -6369,7 +6369,7 @@
           <a:p>
             <a:fld id="{4F17076B-8A0A-4D88-8A59-70E1D7445D20}" type="slidenum">
               <a:rPr lang="en-US" smtClean="0"/>
-              <a:t>92</a:t>
+              <a:t>91</a:t>
             </a:fld>
             <a:endParaRPr lang="en-US"/>
           </a:p>
@@ -6453,7 +6453,7 @@
           <a:p>
             <a:fld id="{4F17076B-8A0A-4D88-8A59-70E1D7445D20}" type="slidenum">
               <a:rPr lang="en-US" smtClean="0"/>
-              <a:t>93</a:t>
+              <a:t>92</a:t>
             </a:fld>
             <a:endParaRPr lang="en-US"/>
           </a:p>
@@ -6537,7 +6537,7 @@
           <a:p>
             <a:fld id="{4F17076B-8A0A-4D88-8A59-70E1D7445D20}" type="slidenum">
               <a:rPr lang="en-US" smtClean="0"/>
-              <a:t>94</a:t>
+              <a:t>93</a:t>
             </a:fld>
             <a:endParaRPr lang="en-US"/>
           </a:p>
@@ -6621,7 +6621,7 @@
           <a:p>
             <a:fld id="{4F17076B-8A0A-4D88-8A59-70E1D7445D20}" type="slidenum">
               <a:rPr lang="en-US" smtClean="0"/>
-              <a:t>95</a:t>
+              <a:t>94</a:t>
             </a:fld>
             <a:endParaRPr lang="en-US"/>
           </a:p>
@@ -6705,7 +6705,7 @@
           <a:p>
             <a:fld id="{4F17076B-8A0A-4D88-8A59-70E1D7445D20}" type="slidenum">
               <a:rPr lang="en-US" smtClean="0"/>
-              <a:t>31</a:t>
+              <a:t>30</a:t>
             </a:fld>
             <a:endParaRPr lang="en-US"/>
           </a:p>
@@ -6789,7 +6789,7 @@
           <a:p>
             <a:fld id="{4F17076B-8A0A-4D88-8A59-70E1D7445D20}" type="slidenum">
               <a:rPr lang="en-US" smtClean="0"/>
-              <a:t>96</a:t>
+              <a:t>95</a:t>
             </a:fld>
             <a:endParaRPr lang="en-US"/>
           </a:p>
@@ -6873,7 +6873,7 @@
           <a:p>
             <a:fld id="{4F17076B-8A0A-4D88-8A59-70E1D7445D20}" type="slidenum">
               <a:rPr lang="en-US" smtClean="0"/>
-              <a:t>97</a:t>
+              <a:t>96</a:t>
             </a:fld>
             <a:endParaRPr lang="en-US"/>
           </a:p>
@@ -6957,7 +6957,7 @@
           <a:p>
             <a:fld id="{4F17076B-8A0A-4D88-8A59-70E1D7445D20}" type="slidenum">
               <a:rPr lang="en-US" smtClean="0"/>
-              <a:t>98</a:t>
+              <a:t>97</a:t>
             </a:fld>
             <a:endParaRPr lang="en-US"/>
           </a:p>
@@ -7041,7 +7041,7 @@
           <a:p>
             <a:fld id="{4F17076B-8A0A-4D88-8A59-70E1D7445D20}" type="slidenum">
               <a:rPr lang="en-US" smtClean="0"/>
-              <a:t>99</a:t>
+              <a:t>98</a:t>
             </a:fld>
             <a:endParaRPr lang="en-US"/>
           </a:p>
@@ -7125,7 +7125,7 @@
           <a:p>
             <a:fld id="{4F17076B-8A0A-4D88-8A59-70E1D7445D20}" type="slidenum">
               <a:rPr lang="en-US" smtClean="0"/>
-              <a:t>100</a:t>
+              <a:t>99</a:t>
             </a:fld>
             <a:endParaRPr lang="en-US"/>
           </a:p>
@@ -7209,7 +7209,7 @@
           <a:p>
             <a:fld id="{4F17076B-8A0A-4D88-8A59-70E1D7445D20}" type="slidenum">
               <a:rPr lang="en-US" smtClean="0"/>
-              <a:t>101</a:t>
+              <a:t>100</a:t>
             </a:fld>
             <a:endParaRPr lang="en-US"/>
           </a:p>
@@ -7293,7 +7293,7 @@
           <a:p>
             <a:fld id="{4F17076B-8A0A-4D88-8A59-70E1D7445D20}" type="slidenum">
               <a:rPr lang="en-US" smtClean="0"/>
-              <a:t>102</a:t>
+              <a:t>101</a:t>
             </a:fld>
             <a:endParaRPr lang="en-US"/>
           </a:p>
@@ -7377,7 +7377,7 @@
           <a:p>
             <a:fld id="{4F17076B-8A0A-4D88-8A59-70E1D7445D20}" type="slidenum">
               <a:rPr lang="en-US" smtClean="0"/>
-              <a:t>103</a:t>
+              <a:t>102</a:t>
             </a:fld>
             <a:endParaRPr lang="en-US"/>
           </a:p>
@@ -7461,7 +7461,7 @@
           <a:p>
             <a:fld id="{4F17076B-8A0A-4D88-8A59-70E1D7445D20}" type="slidenum">
               <a:rPr lang="en-US" smtClean="0"/>
-              <a:t>104</a:t>
+              <a:t>103</a:t>
             </a:fld>
             <a:endParaRPr lang="en-US"/>
           </a:p>
@@ -7545,7 +7545,7 @@
           <a:p>
             <a:fld id="{4F17076B-8A0A-4D88-8A59-70E1D7445D20}" type="slidenum">
               <a:rPr lang="en-US" smtClean="0"/>
-              <a:t>105</a:t>
+              <a:t>104</a:t>
             </a:fld>
             <a:endParaRPr lang="en-US"/>
           </a:p>
@@ -7608,10 +7608,6 @@
           <a:bodyPr/>
           <a:lstStyle/>
           <a:p>
-            <a:r>
-              <a:rPr lang="sr-Latn-RS" dirty="0" smtClean="0"/>
-              <a:t>* U žargonu se nazivaju kablovski Internet</a:t>
-            </a:r>
             <a:endParaRPr lang="en-US" dirty="0"/>
           </a:p>
         </p:txBody>
@@ -7633,7 +7629,7 @@
           <a:p>
             <a:fld id="{4F17076B-8A0A-4D88-8A59-70E1D7445D20}" type="slidenum">
               <a:rPr lang="en-US" smtClean="0"/>
-              <a:t>32</a:t>
+              <a:t>31</a:t>
             </a:fld>
             <a:endParaRPr lang="en-US"/>
           </a:p>
@@ -7717,7 +7713,7 @@
           <a:p>
             <a:fld id="{4F17076B-8A0A-4D88-8A59-70E1D7445D20}" type="slidenum">
               <a:rPr lang="en-US" smtClean="0"/>
-              <a:t>106</a:t>
+              <a:t>105</a:t>
             </a:fld>
             <a:endParaRPr lang="en-US"/>
           </a:p>
@@ -7801,7 +7797,7 @@
           <a:p>
             <a:fld id="{4F17076B-8A0A-4D88-8A59-70E1D7445D20}" type="slidenum">
               <a:rPr lang="en-US" smtClean="0"/>
-              <a:t>107</a:t>
+              <a:t>106</a:t>
             </a:fld>
             <a:endParaRPr lang="en-US"/>
           </a:p>
@@ -7885,7 +7881,7 @@
           <a:p>
             <a:fld id="{4F17076B-8A0A-4D88-8A59-70E1D7445D20}" type="slidenum">
               <a:rPr lang="en-US" smtClean="0"/>
-              <a:t>108</a:t>
+              <a:t>107</a:t>
             </a:fld>
             <a:endParaRPr lang="en-US"/>
           </a:p>
@@ -7969,7 +7965,7 @@
           <a:p>
             <a:fld id="{4F17076B-8A0A-4D88-8A59-70E1D7445D20}" type="slidenum">
               <a:rPr lang="en-US" smtClean="0"/>
-              <a:t>109</a:t>
+              <a:t>108</a:t>
             </a:fld>
             <a:endParaRPr lang="en-US"/>
           </a:p>
@@ -8053,7 +8049,7 @@
           <a:p>
             <a:fld id="{4F17076B-8A0A-4D88-8A59-70E1D7445D20}" type="slidenum">
               <a:rPr lang="en-US" smtClean="0"/>
-              <a:t>110</a:t>
+              <a:t>109</a:t>
             </a:fld>
             <a:endParaRPr lang="en-US"/>
           </a:p>
@@ -8137,7 +8133,7 @@
           <a:p>
             <a:fld id="{4F17076B-8A0A-4D88-8A59-70E1D7445D20}" type="slidenum">
               <a:rPr lang="en-US" smtClean="0"/>
-              <a:t>111</a:t>
+              <a:t>110</a:t>
             </a:fld>
             <a:endParaRPr lang="en-US"/>
           </a:p>
@@ -8221,7 +8217,7 @@
           <a:p>
             <a:fld id="{4F17076B-8A0A-4D88-8A59-70E1D7445D20}" type="slidenum">
               <a:rPr lang="en-US" smtClean="0"/>
-              <a:t>112</a:t>
+              <a:t>111</a:t>
             </a:fld>
             <a:endParaRPr lang="en-US"/>
           </a:p>
@@ -8305,6 +8301,90 @@
           <a:p>
             <a:fld id="{4F17076B-8A0A-4D88-8A59-70E1D7445D20}" type="slidenum">
               <a:rPr lang="en-US" smtClean="0"/>
+              <a:t>112</a:t>
+            </a:fld>
+            <a:endParaRPr lang="en-US"/>
+          </a:p>
+        </p:txBody>
+      </p:sp>
+    </p:spTree>
+    <p:extLst>
+      <p:ext uri="{BB962C8B-B14F-4D97-AF65-F5344CB8AC3E}">
+        <p14:creationId xmlns:p14="http://schemas.microsoft.com/office/powerpoint/2010/main" val="109522752"/>
+      </p:ext>
+    </p:extLst>
+  </p:cSld>
+  <p:clrMapOvr>
+    <a:masterClrMapping/>
+  </p:clrMapOvr>
+</p:notes>
+</file>
+
+<file path=ppt/notesSlides/notesSlide88.xml><?xml version="1.0" encoding="utf-8"?>
+<p:notes xmlns:a="http://schemas.openxmlformats.org/drawingml/2006/main" xmlns:r="http://schemas.openxmlformats.org/officeDocument/2006/relationships" xmlns:p="http://schemas.openxmlformats.org/presentationml/2006/main">
+  <p:cSld>
+    <p:spTree>
+      <p:nvGrpSpPr>
+        <p:cNvPr id="1" name=""/>
+        <p:cNvGrpSpPr/>
+        <p:nvPr/>
+      </p:nvGrpSpPr>
+      <p:grpSpPr>
+        <a:xfrm>
+          <a:off x="0" y="0"/>
+          <a:ext cx="0" cy="0"/>
+          <a:chOff x="0" y="0"/>
+          <a:chExt cx="0" cy="0"/>
+        </a:xfrm>
+      </p:grpSpPr>
+      <p:sp>
+        <p:nvSpPr>
+          <p:cNvPr id="2" name="Slide Image Placeholder 1"/>
+          <p:cNvSpPr>
+            <a:spLocks noGrp="1" noRot="1" noChangeAspect="1"/>
+          </p:cNvSpPr>
+          <p:nvPr>
+            <p:ph type="sldImg"/>
+          </p:nvPr>
+        </p:nvSpPr>
+        <p:spPr/>
+      </p:sp>
+      <p:sp>
+        <p:nvSpPr>
+          <p:cNvPr id="3" name="Notes Placeholder 2"/>
+          <p:cNvSpPr>
+            <a:spLocks noGrp="1"/>
+          </p:cNvSpPr>
+          <p:nvPr>
+            <p:ph type="body" idx="1"/>
+          </p:nvPr>
+        </p:nvSpPr>
+        <p:spPr/>
+        <p:txBody>
+          <a:bodyPr/>
+          <a:lstStyle/>
+          <a:p>
+            <a:endParaRPr lang="en-US" dirty="0"/>
+          </a:p>
+        </p:txBody>
+      </p:sp>
+      <p:sp>
+        <p:nvSpPr>
+          <p:cNvPr id="4" name="Slide Number Placeholder 3"/>
+          <p:cNvSpPr>
+            <a:spLocks noGrp="1"/>
+          </p:cNvSpPr>
+          <p:nvPr>
+            <p:ph type="sldNum" sz="quarter" idx="10"/>
+          </p:nvPr>
+        </p:nvSpPr>
+        <p:spPr/>
+        <p:txBody>
+          <a:bodyPr/>
+          <a:lstStyle/>
+          <a:p>
+            <a:fld id="{4F17076B-8A0A-4D88-8A59-70E1D7445D20}" type="slidenum">
+              <a:rPr lang="en-US" smtClean="0"/>
               <a:t>113</a:t>
             </a:fld>
             <a:endParaRPr lang="en-US"/>
@@ -8368,6 +8448,10 @@
           <a:bodyPr/>
           <a:lstStyle/>
           <a:p>
+            <a:r>
+              <a:rPr lang="sr-Latn-RS" dirty="0" smtClean="0"/>
+              <a:t>* U žargonu se nazivaju kablovski Internet</a:t>
+            </a:r>
             <a:endParaRPr lang="en-US" dirty="0"/>
           </a:p>
         </p:txBody>
@@ -8389,7 +8473,7 @@
           <a:p>
             <a:fld id="{4F17076B-8A0A-4D88-8A59-70E1D7445D20}" type="slidenum">
               <a:rPr lang="en-US" smtClean="0"/>
-              <a:t>33</a:t>
+              <a:t>32</a:t>
             </a:fld>
             <a:endParaRPr lang="en-US"/>
           </a:p>
@@ -36316,7 +36400,19 @@
             </a:r>
             <a:r>
               <a:rPr lang="sr-Latn-RS" altLang="en-US" dirty="0"/>
-              <a:t>(GIS) { sistemi koji </a:t>
+              <a:t>(GIS) </a:t>
+            </a:r>
+            <a:r>
+              <a:rPr lang="en-US" altLang="en-US" dirty="0"/>
+              <a:t>-</a:t>
+            </a:r>
+            <a:r>
+              <a:rPr lang="sr-Latn-RS" altLang="en-US" dirty="0" smtClean="0"/>
+              <a:t> </a:t>
+            </a:r>
+            <a:r>
+              <a:rPr lang="sr-Latn-RS" altLang="en-US" dirty="0"/>
+              <a:t>sistemi koji </a:t>
             </a:r>
             <a:r>
               <a:rPr lang="sr-Latn-RS" altLang="en-US" dirty="0" smtClean="0"/>
@@ -41508,11 +41604,7 @@
             </a:r>
             <a:r>
               <a:rPr lang="sr-Latn-RS" altLang="en-US" dirty="0" smtClean="0"/>
-              <a:t>sloja na </a:t>
-            </a:r>
-            <a:r>
-              <a:rPr lang="sr-Latn-RS" altLang="en-US" dirty="0" smtClean="0"/>
-              <a:t>mre</a:t>
+              <a:t>sloja na mre</a:t>
             </a:r>
             <a:r>
               <a:rPr lang="sr-Latn-RS" altLang="en-US" dirty="0"/>
@@ -42543,7 +42635,6 @@
               <a:rPr lang="sr-Latn-RS" altLang="en-US" dirty="0" smtClean="0"/>
               <a:t>8</a:t>
             </a:r>
-            <a:endParaRPr lang="sr-Latn-RS" altLang="en-US" dirty="0" smtClean="0"/>
           </a:p>
         </p:txBody>
       </p:sp>
@@ -42635,15 +42726,7 @@
                   <a:schemeClr val="hlink"/>
                 </a:solidFill>
               </a:rPr>
-              <a:t>adresa (3</a:t>
-            </a:r>
-            <a:r>
-              <a:rPr lang="sr-Latn-RS" altLang="en-US" sz="3200" dirty="0" smtClean="0">
-                <a:solidFill>
-                  <a:schemeClr val="hlink"/>
-                </a:solidFill>
-              </a:rPr>
-              <a:t>)</a:t>
+              <a:t>adresa (3)</a:t>
             </a:r>
             <a:endParaRPr lang="en-US" altLang="en-US" b="1" dirty="0" smtClean="0"/>
           </a:p>
@@ -42672,11 +42755,7 @@
             <a:pPr marL="857250" lvl="1" indent="-457200" eaLnBrk="1" hangingPunct="1"/>
             <a:r>
               <a:rPr lang="sr-Latn-RS" altLang="en-US" dirty="0" smtClean="0"/>
-              <a:t>Ranije </a:t>
-            </a:r>
-            <a:r>
-              <a:rPr lang="sr-Latn-RS" altLang="en-US" dirty="0" smtClean="0"/>
-              <a:t>su IP </a:t>
+              <a:t>Ranije su IP </a:t>
             </a:r>
             <a:r>
               <a:rPr lang="sr-Latn-RS" altLang="en-US" dirty="0"/>
@@ -43057,15 +43136,7 @@
                   <a:schemeClr val="hlink"/>
                 </a:solidFill>
               </a:rPr>
-              <a:t>adresa (4</a:t>
-            </a:r>
-            <a:r>
-              <a:rPr lang="sr-Latn-RS" altLang="en-US" sz="3200" dirty="0" smtClean="0">
-                <a:solidFill>
-                  <a:schemeClr val="hlink"/>
-                </a:solidFill>
-              </a:rPr>
-              <a:t>)</a:t>
+              <a:t>adresa (4)</a:t>
             </a:r>
             <a:endParaRPr lang="en-US" altLang="en-US" b="1" dirty="0" smtClean="0"/>
           </a:p>
@@ -43395,7 +43466,6 @@
               <a:rPr lang="sr-Latn-RS" altLang="en-US" sz="1200" kern="0" dirty="0" smtClean="0"/>
               <a:t>IP adresa studentskog servera Matematičkog fakulteta</a:t>
             </a:r>
-            <a:endParaRPr lang="sr-Latn-RS" altLang="en-US" sz="1200" kern="0" dirty="0" smtClean="0"/>
           </a:p>
         </p:txBody>
       </p:sp>
@@ -43565,15 +43635,7 @@
                   <a:schemeClr val="hlink"/>
                 </a:solidFill>
               </a:rPr>
-              <a:t> </a:t>
-            </a:r>
-            <a:r>
-              <a:rPr lang="en-US" altLang="en-US" sz="3200" dirty="0" smtClean="0">
-                <a:solidFill>
-                  <a:schemeClr val="hlink"/>
-                </a:solidFill>
-              </a:rPr>
-              <a:t>(</a:t>
+              <a:t> (</a:t>
             </a:r>
             <a:r>
               <a:rPr lang="sr-Latn-RS" altLang="en-US" sz="3200" dirty="0" smtClean="0">
@@ -44901,15 +44963,23 @@
                   <a:schemeClr val="hlink"/>
                 </a:solidFill>
               </a:rPr>
-              <a:t>adrese (</a:t>
-            </a:r>
-            <a:r>
-              <a:rPr lang="sr-Latn-RS" altLang="en-US" sz="3200" dirty="0">
+              <a:t>adrese </a:t>
+            </a:r>
+            <a:r>
+              <a:rPr lang="sr-Latn-RS" altLang="en-US" sz="3200" dirty="0" smtClean="0">
                 <a:solidFill>
                   <a:schemeClr val="hlink"/>
                 </a:solidFill>
               </a:rPr>
-              <a:t>4</a:t>
+              <a:t>(</a:t>
+            </a:r>
+            <a:r>
+              <a:rPr lang="en-US" altLang="en-US" sz="3200" dirty="0">
+                <a:solidFill>
+                  <a:schemeClr val="hlink"/>
+                </a:solidFill>
+              </a:rPr>
+              <a:t>2</a:t>
             </a:r>
             <a:r>
               <a:rPr lang="sr-Latn-RS" altLang="en-US" sz="3200" dirty="0" smtClean="0">
@@ -45132,7 +45202,23 @@
                   <a:schemeClr val="hlink"/>
                 </a:solidFill>
               </a:rPr>
-              <a:t>(5)</a:t>
+              <a:t>(</a:t>
+            </a:r>
+            <a:r>
+              <a:rPr lang="en-US" altLang="en-US" sz="3200" dirty="0" smtClean="0">
+                <a:solidFill>
+                  <a:schemeClr val="hlink"/>
+                </a:solidFill>
+              </a:rPr>
+              <a:t>3</a:t>
+            </a:r>
+            <a:r>
+              <a:rPr lang="sr-Latn-RS" altLang="en-US" sz="3200" dirty="0" smtClean="0">
+                <a:solidFill>
+                  <a:schemeClr val="hlink"/>
+                </a:solidFill>
+              </a:rPr>
+              <a:t>)</a:t>
             </a:r>
             <a:endParaRPr lang="en-US" altLang="en-US" b="1" dirty="0" smtClean="0"/>
           </a:p>
@@ -45839,16 +45925,24 @@
               <a:t> se mogu graditi </a:t>
             </a:r>
             <a:r>
-              <a:rPr lang="sr-Latn-RS" altLang="en-US" dirty="0" err="1"/>
-              <a:t>staticki</a:t>
-            </a:r>
-            <a:r>
-              <a:rPr lang="sr-Latn-RS" altLang="en-US" dirty="0"/>
-              <a:t> ili </a:t>
-            </a:r>
-            <a:r>
-              <a:rPr lang="sr-Latn-RS" altLang="en-US" dirty="0" err="1"/>
-              <a:t>dinamicki</a:t>
+              <a:rPr lang="sr-Latn-RS" altLang="en-US" dirty="0" smtClean="0"/>
+              <a:t>stati</a:t>
+            </a:r>
+            <a:r>
+              <a:rPr lang="sr-Latn-RS" altLang="en-US" dirty="0"/>
+              <a:t>č</a:t>
+            </a:r>
+            <a:r>
+              <a:rPr lang="sr-Latn-RS" altLang="en-US" dirty="0" smtClean="0"/>
+              <a:t>ki </a:t>
+            </a:r>
+            <a:r>
+              <a:rPr lang="sr-Latn-RS" altLang="en-US" dirty="0"/>
+              <a:t>ili </a:t>
+            </a:r>
+            <a:r>
+              <a:rPr lang="sr-Latn-RS" altLang="en-US" dirty="0" smtClean="0"/>
+              <a:t>dinamički</a:t>
             </a:r>
             <a:endParaRPr lang="sr-Latn-RS" altLang="en-US" dirty="0" smtClean="0"/>
           </a:p>
@@ -50465,13 +50559,8 @@
             </a:r>
             <a:r>
               <a:rPr lang="sr-Latn-RS" altLang="en-US" dirty="0" smtClean="0"/>
-              <a:t>zasnovana na veb </a:t>
-            </a:r>
-            <a:r>
-              <a:rPr lang="sr-Latn-RS" altLang="en-US" dirty="0" smtClean="0"/>
-              <a:t>stranicama </a:t>
-            </a:r>
-            <a:endParaRPr lang="sr-Latn-RS" altLang="en-US" dirty="0" smtClean="0"/>
+              <a:t>zasnovana na veb stranicama </a:t>
+            </a:r>
           </a:p>
           <a:p>
             <a:pPr marL="1257300" lvl="2" indent="-457200" eaLnBrk="1" hangingPunct="1"/>

</xml_diff>